<commit_message>
errata corrige pp e scrum
</commit_message>
<xml_diff>
--- a/02_DOCUMENTATION/PowerPoint.pptx
+++ b/02_DOCUMENTATION/PowerPoint.pptx
@@ -233,7 +233,7 @@
           </a:lstStyle>
           <a:p>
             <a:fld id="{C8737C81-EFC4-477E-B9FF-682ABA656A66}" type="datetimeFigureOut">
-              <a:t>02/11/2024</a:t>
+              <a:t>05/11/2024</a:t>
             </a:fld>
             <a:endParaRPr lang="it-IT"/>
           </a:p>
@@ -651,40 +651,7 @@
               <a:buFont typeface="Calibri"/>
               <a:buChar char="-"/>
             </a:pPr>
-            <a:r>
-              <a:rPr lang="en-US">
-                <a:cs typeface="Calibri"/>
-              </a:rPr>
-              <a:t>WHY</a:t>
-            </a:r>
-          </a:p>
-          <a:p>
-            <a:pPr marL="171450" indent="-171450">
-              <a:buFont typeface="Calibri"/>
-              <a:buChar char="-"/>
-            </a:pPr>
-            <a:r>
-              <a:rPr lang="en-US">
-                <a:cs typeface="Calibri"/>
-              </a:rPr>
-              <a:t>THE ALGORITHM</a:t>
-            </a:r>
-          </a:p>
-          <a:p>
-            <a:pPr marL="171450" indent="-171450">
-              <a:buFont typeface="Calibri"/>
-              <a:buChar char="-"/>
-            </a:pPr>
-            <a:endParaRPr lang="en-US">
-              <a:cs typeface="Calibri"/>
-            </a:endParaRPr>
-          </a:p>
-          <a:p>
-            <a:pPr marL="171450" indent="-171450">
-              <a:buFont typeface="Calibri"/>
-              <a:buChar char="-"/>
-            </a:pPr>
-            <a:endParaRPr lang="en-US">
+            <a:endParaRPr lang="en-US" dirty="0">
               <a:cs typeface="Calibri"/>
             </a:endParaRPr>
           </a:p>
@@ -1359,63 +1326,15 @@
           <a:bodyPr/>
           <a:lstStyle/>
           <a:p>
-            <a:pPr marL="171450" indent="-171450">
+            <a:pPr marL="0" indent="0">
               <a:buFont typeface="Calibri"/>
-              <a:buChar char="-"/>
+              <a:buNone/>
             </a:pPr>
             <a:r>
-              <a:rPr lang="en-US">
+              <a:rPr lang="en-US" dirty="0">
                 <a:cs typeface="Calibri"/>
               </a:rPr>
-              <a:t>OVERCOME LIMITATIONS</a:t>
-            </a:r>
-          </a:p>
-          <a:p>
-            <a:pPr marL="171450" indent="-171450">
-              <a:buFont typeface="Calibri"/>
-              <a:buChar char="-"/>
-            </a:pPr>
-            <a:r>
-              <a:rPr lang="en-US">
-                <a:cs typeface="Calibri"/>
-              </a:rPr>
-              <a:t>PRIMARY GOAL -&gt; ENSURE DEP.</a:t>
-            </a:r>
-          </a:p>
-          <a:p>
-            <a:pPr marL="171450" indent="-171450">
-              <a:buFont typeface="Calibri"/>
-              <a:buChar char="-"/>
-            </a:pPr>
-            <a:r>
-              <a:rPr lang="en-US">
-                <a:cs typeface="Calibri"/>
-              </a:rPr>
-              <a:t>DOCKER</a:t>
-            </a:r>
-          </a:p>
-          <a:p>
-            <a:pPr marL="171450" indent="-171450">
-              <a:buFont typeface="Calibri"/>
-              <a:buChar char="-"/>
-            </a:pPr>
-            <a:r>
-              <a:rPr lang="en-US">
-                <a:cs typeface="Calibri"/>
-              </a:rPr>
-              <a:t>NODEJS AND REPLICAS (AVAIL. AND REL.)</a:t>
-            </a:r>
-          </a:p>
-          <a:p>
-            <a:pPr marL="171450" indent="-171450">
-              <a:buFont typeface="Calibri"/>
-              <a:buChar char="-"/>
-            </a:pPr>
-            <a:r>
-              <a:rPr lang="en-US">
-                <a:cs typeface="Calibri"/>
-              </a:rPr>
-              <a:t>3 MECHANISM</a:t>
+              <a:t>Entire dev process: 6 weeks, totaling around 160 work hours</a:t>
             </a:r>
           </a:p>
         </p:txBody>
@@ -1499,63 +1418,15 @@
           <a:bodyPr/>
           <a:lstStyle/>
           <a:p>
-            <a:pPr marL="171450" indent="-171450">
+            <a:pPr marL="0" indent="0">
               <a:buFont typeface="Calibri"/>
-              <a:buChar char="-"/>
+              <a:buNone/>
             </a:pPr>
             <a:r>
-              <a:rPr lang="en-US">
+              <a:rPr lang="en-US" dirty="0">
                 <a:cs typeface="Calibri"/>
               </a:rPr>
-              <a:t>OVERCOME LIMITATIONS</a:t>
-            </a:r>
-          </a:p>
-          <a:p>
-            <a:pPr marL="171450" indent="-171450">
-              <a:buFont typeface="Calibri"/>
-              <a:buChar char="-"/>
-            </a:pPr>
-            <a:r>
-              <a:rPr lang="en-US">
-                <a:cs typeface="Calibri"/>
-              </a:rPr>
-              <a:t>PRIMARY GOAL -&gt; ENSURE DEP.</a:t>
-            </a:r>
-          </a:p>
-          <a:p>
-            <a:pPr marL="171450" indent="-171450">
-              <a:buFont typeface="Calibri"/>
-              <a:buChar char="-"/>
-            </a:pPr>
-            <a:r>
-              <a:rPr lang="en-US">
-                <a:cs typeface="Calibri"/>
-              </a:rPr>
-              <a:t>DOCKER</a:t>
-            </a:r>
-          </a:p>
-          <a:p>
-            <a:pPr marL="171450" indent="-171450">
-              <a:buFont typeface="Calibri"/>
-              <a:buChar char="-"/>
-            </a:pPr>
-            <a:r>
-              <a:rPr lang="en-US">
-                <a:cs typeface="Calibri"/>
-              </a:rPr>
-              <a:t>NODEJS AND REPLICAS (AVAIL. AND REL.)</a:t>
-            </a:r>
-          </a:p>
-          <a:p>
-            <a:pPr marL="171450" indent="-171450">
-              <a:buFont typeface="Calibri"/>
-              <a:buChar char="-"/>
-            </a:pPr>
-            <a:r>
-              <a:rPr lang="en-US">
-                <a:cs typeface="Calibri"/>
-              </a:rPr>
-              <a:t>3 MECHANISM</a:t>
+              <a:t>- Quickly spot any delays and make adjustments to stay on schedule</a:t>
             </a:r>
           </a:p>
         </p:txBody>
@@ -1640,45 +1511,39 @@
           <a:lstStyle/>
           <a:p>
             <a:pPr marL="171450" indent="-171450">
-              <a:buFont typeface="Calibri"/>
+              <a:buFontTx/>
               <a:buChar char="-"/>
             </a:pPr>
             <a:r>
-              <a:rPr lang="en-US">
+              <a:rPr lang="en-US" u="sng" dirty="0">
                 <a:cs typeface="Calibri"/>
               </a:rPr>
-              <a:t>WHY</a:t>
+              <a:t>To ensure clear responsibility for each activity</a:t>
             </a:r>
           </a:p>
           <a:p>
             <a:pPr marL="171450" indent="-171450">
-              <a:buFont typeface="Calibri"/>
+              <a:buFontTx/>
               <a:buChar char="-"/>
             </a:pPr>
             <a:r>
-              <a:rPr lang="en-US">
+              <a:rPr lang="en-US" u="sng" dirty="0">
                 <a:cs typeface="Calibri"/>
               </a:rPr>
-              <a:t>THE ALGORITHM</a:t>
+              <a:t>Co </a:t>
             </a:r>
-          </a:p>
-          <a:p>
-            <a:pPr marL="171450" indent="-171450">
-              <a:buFont typeface="Calibri"/>
-              <a:buChar char="-"/>
-            </a:pPr>
-            <a:endParaRPr lang="en-US">
-              <a:cs typeface="Calibri"/>
-            </a:endParaRPr>
-          </a:p>
-          <a:p>
-            <a:pPr marL="171450" indent="-171450">
-              <a:buFont typeface="Calibri"/>
-              <a:buChar char="-"/>
-            </a:pPr>
-            <a:endParaRPr lang="en-US">
-              <a:cs typeface="Calibri"/>
-            </a:endParaRPr>
+            <a:r>
+              <a:rPr lang="en-US" u="sng" dirty="0" err="1">
+                <a:cs typeface="Calibri"/>
+              </a:rPr>
+              <a:t>mpprehensive</a:t>
+            </a:r>
+            <a:r>
+              <a:rPr lang="en-US" u="sng" dirty="0">
+                <a:cs typeface="Calibri"/>
+              </a:rPr>
+              <a:t> view of the work to be done, the priorities and individual responsibilities, helping us to keep the project on track</a:t>
+            </a:r>
           </a:p>
         </p:txBody>
       </p:sp>
@@ -1765,60 +1630,9 @@
               <a:buFont typeface="Calibri"/>
               <a:buChar char="-"/>
             </a:pPr>
-            <a:r>
-              <a:rPr lang="en-US">
-                <a:cs typeface="Calibri"/>
-              </a:rPr>
-              <a:t>OVERCOME LIMITATIONS</a:t>
-            </a:r>
-          </a:p>
-          <a:p>
-            <a:pPr marL="171450" indent="-171450">
-              <a:buFont typeface="Calibri"/>
-              <a:buChar char="-"/>
-            </a:pPr>
-            <a:r>
-              <a:rPr lang="en-US">
-                <a:cs typeface="Calibri"/>
-              </a:rPr>
-              <a:t>PRIMARY GOAL -&gt; ENSURE DEP.</a:t>
-            </a:r>
-          </a:p>
-          <a:p>
-            <a:pPr marL="171450" indent="-171450">
-              <a:buFont typeface="Calibri"/>
-              <a:buChar char="-"/>
-            </a:pPr>
-            <a:r>
-              <a:rPr lang="en-US">
-                <a:cs typeface="Calibri"/>
-              </a:rPr>
-              <a:t>DOCKER</a:t>
-            </a:r>
-          </a:p>
-          <a:p>
-            <a:pPr marL="171450" indent="-171450">
-              <a:buFont typeface="Calibri"/>
-              <a:buChar char="-"/>
-            </a:pPr>
-            <a:r>
-              <a:rPr lang="en-US">
-                <a:cs typeface="Calibri"/>
-              </a:rPr>
-              <a:t>NODEJS AND REPLICAS (AVAIL. AND REL.)</a:t>
-            </a:r>
-          </a:p>
-          <a:p>
-            <a:pPr marL="171450" indent="-171450">
-              <a:buFont typeface="Calibri"/>
-              <a:buChar char="-"/>
-            </a:pPr>
-            <a:r>
-              <a:rPr lang="en-US">
-                <a:cs typeface="Calibri"/>
-              </a:rPr>
-              <a:t>3 MECHANISM</a:t>
-            </a:r>
+            <a:endParaRPr lang="en-US" dirty="0">
+              <a:cs typeface="Calibri"/>
+            </a:endParaRPr>
           </a:p>
         </p:txBody>
       </p:sp>
@@ -1905,40 +1719,7 @@
               <a:buFont typeface="Calibri"/>
               <a:buChar char="-"/>
             </a:pPr>
-            <a:r>
-              <a:rPr lang="en-US">
-                <a:cs typeface="Calibri"/>
-              </a:rPr>
-              <a:t>WHY</a:t>
-            </a:r>
-          </a:p>
-          <a:p>
-            <a:pPr marL="171450" indent="-171450">
-              <a:buFont typeface="Calibri"/>
-              <a:buChar char="-"/>
-            </a:pPr>
-            <a:r>
-              <a:rPr lang="en-US">
-                <a:cs typeface="Calibri"/>
-              </a:rPr>
-              <a:t>THE ALGORITHM</a:t>
-            </a:r>
-          </a:p>
-          <a:p>
-            <a:pPr marL="171450" indent="-171450">
-              <a:buFont typeface="Calibri"/>
-              <a:buChar char="-"/>
-            </a:pPr>
-            <a:endParaRPr lang="en-US">
-              <a:cs typeface="Calibri"/>
-            </a:endParaRPr>
-          </a:p>
-          <a:p>
-            <a:pPr marL="171450" indent="-171450">
-              <a:buFont typeface="Calibri"/>
-              <a:buChar char="-"/>
-            </a:pPr>
-            <a:endParaRPr lang="en-US">
+            <a:endParaRPr lang="en-US" dirty="0">
               <a:cs typeface="Calibri"/>
             </a:endParaRPr>
           </a:p>
@@ -2045,40 +1826,7 @@
               <a:buFont typeface="Calibri"/>
               <a:buChar char="-"/>
             </a:pPr>
-            <a:r>
-              <a:rPr lang="en-US">
-                <a:cs typeface="Calibri"/>
-              </a:rPr>
-              <a:t>WHY</a:t>
-            </a:r>
-          </a:p>
-          <a:p>
-            <a:pPr marL="171450" indent="-171450">
-              <a:buFont typeface="Calibri"/>
-              <a:buChar char="-"/>
-            </a:pPr>
-            <a:r>
-              <a:rPr lang="en-US">
-                <a:cs typeface="Calibri"/>
-              </a:rPr>
-              <a:t>THE ALGORITHM</a:t>
-            </a:r>
-          </a:p>
-          <a:p>
-            <a:pPr marL="171450" indent="-171450">
-              <a:buFont typeface="Calibri"/>
-              <a:buChar char="-"/>
-            </a:pPr>
-            <a:endParaRPr lang="en-US">
-              <a:cs typeface="Calibri"/>
-            </a:endParaRPr>
-          </a:p>
-          <a:p>
-            <a:pPr marL="171450" indent="-171450">
-              <a:buFont typeface="Calibri"/>
-              <a:buChar char="-"/>
-            </a:pPr>
-            <a:endParaRPr lang="en-US">
+            <a:endParaRPr lang="en-US" dirty="0">
               <a:cs typeface="Calibri"/>
             </a:endParaRPr>
           </a:p>
@@ -2191,40 +1939,7 @@
               <a:buFont typeface="Calibri"/>
               <a:buChar char="-"/>
             </a:pPr>
-            <a:r>
-              <a:rPr lang="en-US">
-                <a:cs typeface="Calibri"/>
-              </a:rPr>
-              <a:t>WHY</a:t>
-            </a:r>
-          </a:p>
-          <a:p>
-            <a:pPr marL="171450" indent="-171450">
-              <a:buFont typeface="Calibri"/>
-              <a:buChar char="-"/>
-            </a:pPr>
-            <a:r>
-              <a:rPr lang="en-US">
-                <a:cs typeface="Calibri"/>
-              </a:rPr>
-              <a:t>THE ALGORITHM</a:t>
-            </a:r>
-          </a:p>
-          <a:p>
-            <a:pPr marL="171450" indent="-171450">
-              <a:buFont typeface="Calibri"/>
-              <a:buChar char="-"/>
-            </a:pPr>
-            <a:endParaRPr lang="en-US">
-              <a:cs typeface="Calibri"/>
-            </a:endParaRPr>
-          </a:p>
-          <a:p>
-            <a:pPr marL="171450" indent="-171450">
-              <a:buFont typeface="Calibri"/>
-              <a:buChar char="-"/>
-            </a:pPr>
-            <a:endParaRPr lang="en-US">
+            <a:endParaRPr lang="en-US" dirty="0">
               <a:cs typeface="Calibri"/>
             </a:endParaRPr>
           </a:p>
@@ -2337,40 +2052,7 @@
               <a:buFont typeface="Calibri"/>
               <a:buChar char="-"/>
             </a:pPr>
-            <a:r>
-              <a:rPr lang="en-US">
-                <a:cs typeface="Calibri"/>
-              </a:rPr>
-              <a:t>WHY</a:t>
-            </a:r>
-          </a:p>
-          <a:p>
-            <a:pPr marL="171450" indent="-171450">
-              <a:buFont typeface="Calibri"/>
-              <a:buChar char="-"/>
-            </a:pPr>
-            <a:r>
-              <a:rPr lang="en-US">
-                <a:cs typeface="Calibri"/>
-              </a:rPr>
-              <a:t>THE ALGORITHM</a:t>
-            </a:r>
-          </a:p>
-          <a:p>
-            <a:pPr marL="171450" indent="-171450">
-              <a:buFont typeface="Calibri"/>
-              <a:buChar char="-"/>
-            </a:pPr>
-            <a:endParaRPr lang="en-US">
-              <a:cs typeface="Calibri"/>
-            </a:endParaRPr>
-          </a:p>
-          <a:p>
-            <a:pPr marL="171450" indent="-171450">
-              <a:buFont typeface="Calibri"/>
-              <a:buChar char="-"/>
-            </a:pPr>
-            <a:endParaRPr lang="en-US">
+            <a:endParaRPr lang="en-US" dirty="0">
               <a:cs typeface="Calibri"/>
             </a:endParaRPr>
           </a:p>
@@ -2629,40 +2311,7 @@
               <a:buFont typeface="Calibri"/>
               <a:buChar char="-"/>
             </a:pPr>
-            <a:r>
-              <a:rPr lang="en-US">
-                <a:cs typeface="Calibri"/>
-              </a:rPr>
-              <a:t>WHY</a:t>
-            </a:r>
-          </a:p>
-          <a:p>
-            <a:pPr marL="171450" indent="-171450">
-              <a:buFont typeface="Calibri"/>
-              <a:buChar char="-"/>
-            </a:pPr>
-            <a:r>
-              <a:rPr lang="en-US">
-                <a:cs typeface="Calibri"/>
-              </a:rPr>
-              <a:t>THE ALGORITHM</a:t>
-            </a:r>
-          </a:p>
-          <a:p>
-            <a:pPr marL="171450" indent="-171450">
-              <a:buFont typeface="Calibri"/>
-              <a:buChar char="-"/>
-            </a:pPr>
-            <a:endParaRPr lang="en-US">
-              <a:cs typeface="Calibri"/>
-            </a:endParaRPr>
-          </a:p>
-          <a:p>
-            <a:pPr marL="171450" indent="-171450">
-              <a:buFont typeface="Calibri"/>
-              <a:buChar char="-"/>
-            </a:pPr>
-            <a:endParaRPr lang="en-US">
+            <a:endParaRPr lang="en-US" dirty="0">
               <a:cs typeface="Calibri"/>
             </a:endParaRPr>
           </a:p>
@@ -2775,40 +2424,7 @@
               <a:buFont typeface="Calibri"/>
               <a:buChar char="-"/>
             </a:pPr>
-            <a:r>
-              <a:rPr lang="en-US">
-                <a:cs typeface="Calibri"/>
-              </a:rPr>
-              <a:t>WHY</a:t>
-            </a:r>
-          </a:p>
-          <a:p>
-            <a:pPr marL="171450" indent="-171450">
-              <a:buFont typeface="Calibri"/>
-              <a:buChar char="-"/>
-            </a:pPr>
-            <a:r>
-              <a:rPr lang="en-US">
-                <a:cs typeface="Calibri"/>
-              </a:rPr>
-              <a:t>THE ALGORITHM</a:t>
-            </a:r>
-          </a:p>
-          <a:p>
-            <a:pPr marL="171450" indent="-171450">
-              <a:buFont typeface="Calibri"/>
-              <a:buChar char="-"/>
-            </a:pPr>
-            <a:endParaRPr lang="en-US">
-              <a:cs typeface="Calibri"/>
-            </a:endParaRPr>
-          </a:p>
-          <a:p>
-            <a:pPr marL="171450" indent="-171450">
-              <a:buFont typeface="Calibri"/>
-              <a:buChar char="-"/>
-            </a:pPr>
-            <a:endParaRPr lang="en-US">
+            <a:endParaRPr lang="en-US" dirty="0">
               <a:cs typeface="Calibri"/>
             </a:endParaRPr>
           </a:p>
@@ -3004,7 +2620,7 @@
           <a:p>
             <a:fld id="{76419C78-162A-4509-85F0-AC9BE1C0F863}" type="datetimeFigureOut">
               <a:rPr lang="en-US" smtClean="0"/>
-              <a:t>11/2/2024</a:t>
+              <a:t>11/5/2024</a:t>
             </a:fld>
             <a:endParaRPr lang="en-US"/>
           </a:p>
@@ -3204,7 +2820,7 @@
           <a:p>
             <a:fld id="{76419C78-162A-4509-85F0-AC9BE1C0F863}" type="datetimeFigureOut">
               <a:rPr lang="en-US" smtClean="0"/>
-              <a:t>11/2/2024</a:t>
+              <a:t>11/5/2024</a:t>
             </a:fld>
             <a:endParaRPr lang="en-US"/>
           </a:p>
@@ -3414,7 +3030,7 @@
           <a:p>
             <a:fld id="{76419C78-162A-4509-85F0-AC9BE1C0F863}" type="datetimeFigureOut">
               <a:rPr lang="en-US" smtClean="0"/>
-              <a:t>11/2/2024</a:t>
+              <a:t>11/5/2024</a:t>
             </a:fld>
             <a:endParaRPr lang="en-US"/>
           </a:p>
@@ -3614,7 +3230,7 @@
           <a:p>
             <a:fld id="{76419C78-162A-4509-85F0-AC9BE1C0F863}" type="datetimeFigureOut">
               <a:rPr lang="en-US" smtClean="0"/>
-              <a:t>11/2/2024</a:t>
+              <a:t>11/5/2024</a:t>
             </a:fld>
             <a:endParaRPr lang="en-US"/>
           </a:p>
@@ -3890,7 +3506,7 @@
           <a:p>
             <a:fld id="{76419C78-162A-4509-85F0-AC9BE1C0F863}" type="datetimeFigureOut">
               <a:rPr lang="en-US" smtClean="0"/>
-              <a:t>11/2/2024</a:t>
+              <a:t>11/5/2024</a:t>
             </a:fld>
             <a:endParaRPr lang="en-US"/>
           </a:p>
@@ -4158,7 +3774,7 @@
           <a:p>
             <a:fld id="{76419C78-162A-4509-85F0-AC9BE1C0F863}" type="datetimeFigureOut">
               <a:rPr lang="en-US" smtClean="0"/>
-              <a:t>11/2/2024</a:t>
+              <a:t>11/5/2024</a:t>
             </a:fld>
             <a:endParaRPr lang="en-US"/>
           </a:p>
@@ -4573,7 +4189,7 @@
           <a:p>
             <a:fld id="{76419C78-162A-4509-85F0-AC9BE1C0F863}" type="datetimeFigureOut">
               <a:rPr lang="en-US" smtClean="0"/>
-              <a:t>11/2/2024</a:t>
+              <a:t>11/5/2024</a:t>
             </a:fld>
             <a:endParaRPr lang="en-US"/>
           </a:p>
@@ -4715,7 +4331,7 @@
           <a:p>
             <a:fld id="{76419C78-162A-4509-85F0-AC9BE1C0F863}" type="datetimeFigureOut">
               <a:rPr lang="en-US" smtClean="0"/>
-              <a:t>11/2/2024</a:t>
+              <a:t>11/5/2024</a:t>
             </a:fld>
             <a:endParaRPr lang="en-US"/>
           </a:p>
@@ -4828,7 +4444,7 @@
           <a:p>
             <a:fld id="{76419C78-162A-4509-85F0-AC9BE1C0F863}" type="datetimeFigureOut">
               <a:rPr lang="en-US" smtClean="0"/>
-              <a:t>11/2/2024</a:t>
+              <a:t>11/5/2024</a:t>
             </a:fld>
             <a:endParaRPr lang="en-US"/>
           </a:p>
@@ -5141,7 +4757,7 @@
           <a:p>
             <a:fld id="{76419C78-162A-4509-85F0-AC9BE1C0F863}" type="datetimeFigureOut">
               <a:rPr lang="en-US" smtClean="0"/>
-              <a:t>11/2/2024</a:t>
+              <a:t>11/5/2024</a:t>
             </a:fld>
             <a:endParaRPr lang="en-US"/>
           </a:p>
@@ -5430,7 +5046,7 @@
           <a:p>
             <a:fld id="{76419C78-162A-4509-85F0-AC9BE1C0F863}" type="datetimeFigureOut">
               <a:rPr lang="en-US" smtClean="0"/>
-              <a:t>11/2/2024</a:t>
+              <a:t>11/5/2024</a:t>
             </a:fld>
             <a:endParaRPr lang="en-US"/>
           </a:p>
@@ -5673,7 +5289,7 @@
           <a:p>
             <a:fld id="{76419C78-162A-4509-85F0-AC9BE1C0F863}" type="datetimeFigureOut">
               <a:rPr lang="en-US" smtClean="0"/>
-              <a:t>11/2/2024</a:t>
+              <a:t>11/5/2024</a:t>
             </a:fld>
             <a:endParaRPr lang="en-US"/>
           </a:p>
@@ -18710,10 +18326,10 @@
       </p:sp>
       <p:pic>
         <p:nvPicPr>
-          <p:cNvPr id="16" name="Immagine 15" descr="Immagine che contiene linea, Parallelo, testo, Diagramma&#10;&#10;Descrizione generata automaticamente">
-            <a:extLst>
-              <a:ext uri="{FF2B5EF4-FFF2-40B4-BE49-F238E27FC236}">
-                <a16:creationId xmlns:a16="http://schemas.microsoft.com/office/drawing/2014/main" id="{ACFAA03D-2F61-55F3-C0AB-C261A6771897}"/>
+          <p:cNvPr id="4" name="Immagine 3" descr="Immagine che contiene linea, Parallelo, pendio, schermata&#10;&#10;Descrizione generata automaticamente">
+            <a:extLst>
+              <a:ext uri="{FF2B5EF4-FFF2-40B4-BE49-F238E27FC236}">
+                <a16:creationId xmlns:a16="http://schemas.microsoft.com/office/drawing/2014/main" id="{CC0573B5-4576-9B32-584F-E3200171D47A}"/>
               </a:ext>
             </a:extLst>
           </p:cNvPr>
@@ -18723,15 +18339,21 @@
           <p:nvPr/>
         </p:nvPicPr>
         <p:blipFill>
-          <a:blip r:embed="rId3"/>
+          <a:blip r:embed="rId3">
+            <a:extLst>
+              <a:ext uri="{28A0092B-C50C-407E-A947-70E740481C1C}">
+                <a14:useLocalDpi xmlns:a14="http://schemas.microsoft.com/office/drawing/2010/main" val="0"/>
+              </a:ext>
+            </a:extLst>
+          </a:blip>
           <a:stretch>
             <a:fillRect/>
           </a:stretch>
         </p:blipFill>
         <p:spPr>
           <a:xfrm>
-            <a:off x="139224" y="1954601"/>
-            <a:ext cx="11917180" cy="3941955"/>
+            <a:off x="0" y="1978269"/>
+            <a:ext cx="12192000" cy="3727938"/>
           </a:xfrm>
           <a:prstGeom prst="rect">
             <a:avLst/>
@@ -21573,7 +21195,7 @@
           <a:p>
             <a:pPr algn="ctr"/>
             <a:r>
-              <a:rPr lang="it-IT" sz="2000">
+              <a:rPr lang="it-IT" sz="2000" dirty="0">
                 <a:solidFill>
                   <a:schemeClr val="bg1"/>
                 </a:solidFill>
@@ -21585,16 +21207,16 @@
           <a:p>
             <a:pPr algn="ctr"/>
             <a:r>
-              <a:rPr lang="it-IT" sz="2800" b="1">
+              <a:rPr lang="it-IT" sz="2800" b="1" dirty="0">
                 <a:solidFill>
                   <a:schemeClr val="bg1"/>
                 </a:solidFill>
                 <a:latin typeface="Aptos Display"/>
               </a:rPr>
-              <a:t>CLIENT</a:t>
+              <a:t>PATIENT</a:t>
             </a:r>
             <a:br>
-              <a:rPr lang="it-IT" sz="2800" b="1">
+              <a:rPr lang="it-IT" sz="2800" b="1" dirty="0">
                 <a:solidFill>
                   <a:schemeClr val="bg1"/>
                 </a:solidFill>
@@ -21602,7 +21224,7 @@
               </a:rPr>
             </a:br>
             <a:r>
-              <a:rPr lang="it-IT" sz="2800" b="1">
+              <a:rPr lang="it-IT" sz="2800" b="1" dirty="0">
                 <a:solidFill>
                   <a:schemeClr val="bg1"/>
                 </a:solidFill>

</xml_diff>